<commit_message>
feat(marketing): inject native 8k assets and redesign presentation slides for premium SaaS look
</commit_message>
<xml_diff>
--- a/smart-building/docs/marketing/Pitch_Deck_UBBEE.pptx
+++ b/smart-building/docs/marketing/Pitch_Deck_UBBEE.pptx
@@ -11,12 +11,9 @@
     <p:sldId id="259" r:id="rId5"/>
     <p:sldId id="260" r:id="rId6"/>
     <p:sldId id="261" r:id="rId7"/>
-    <p:sldId id="262" r:id="rId8"/>
-    <p:sldId id="263" r:id="rId9"/>
-    <p:sldId id="264" r:id="rId10"/>
   </p:sldIdLst>
   <p:notesMasterIdLst>
-    <p:notesMasterId r:id="rId11"/>
+    <p:notesMasterId r:id="rId8"/>
   </p:notesMasterIdLst>
   <p:sldSz cx="9144000" cy="5143500"/>
   <p:notesSz cx="5143500" cy="9144000"/>
@@ -992,270 +989,6 @@
 </p:notes>
 </file>
 
-<file path=ppt/notesSlides/notesSlide7.xml><?xml version="1.0" encoding="utf-8"?>
-<p:notes xmlns:a="http://schemas.openxmlformats.org/drawingml/2006/main" xmlns:r="http://schemas.openxmlformats.org/officeDocument/2006/relationships" xmlns:p="http://schemas.openxmlformats.org/presentationml/2006/main">
-  <p:cSld>
-    <p:spTree>
-      <p:nvGrpSpPr>
-        <p:cNvPr id="1" name=""/>
-        <p:cNvGrpSpPr/>
-        <p:nvPr/>
-      </p:nvGrpSpPr>
-      <p:grpSpPr>
-        <a:xfrm>
-          <a:off x="0" y="0"/>
-          <a:ext cx="0" cy="0"/>
-          <a:chOff x="0" y="0"/>
-          <a:chExt cx="0" cy="0"/>
-        </a:xfrm>
-      </p:grpSpPr>
-      <p:sp>
-        <p:nvSpPr>
-          <p:cNvPr id="2" name="Slide Image Placeholder 1"/>
-          <p:cNvSpPr>
-            <a:spLocks noGrp="1" noRot="1" noChangeAspect="1"/>
-          </p:cNvSpPr>
-          <p:nvPr>
-            <p:ph type="sldImg"/>
-          </p:nvPr>
-        </p:nvSpPr>
-        <p:spPr/>
-      </p:sp>
-      <p:sp>
-        <p:nvSpPr>
-          <p:cNvPr id="3" name="Notes Placeholder 2"/>
-          <p:cNvSpPr>
-            <a:spLocks noGrp="1"/>
-          </p:cNvSpPr>
-          <p:nvPr>
-            <p:ph type="body" idx="1"/>
-          </p:nvPr>
-        </p:nvSpPr>
-        <p:spPr/>
-        <p:txBody>
-          <a:bodyPr/>
-          <a:lstStyle/>
-          <a:p>
-            <a:r>
-              <a:rPr lang="en-US" dirty="0"/>
-              <a:t/>
-            </a:r>
-            <a:endParaRPr lang="en-US" dirty="0"/>
-          </a:p>
-        </p:txBody>
-      </p:sp>
-      <p:sp>
-        <p:nvSpPr>
-          <p:cNvPr id="4" name="Slide Number Placeholder 3"/>
-          <p:cNvSpPr>
-            <a:spLocks noGrp="1"/>
-          </p:cNvSpPr>
-          <p:nvPr>
-            <p:ph type="sldNum" sz="quarter" idx="10"/>
-          </p:nvPr>
-        </p:nvSpPr>
-        <p:spPr/>
-        <p:txBody>
-          <a:bodyPr/>
-          <a:lstStyle/>
-          <a:p>
-            <a:fld id="{F7021451-1387-4CA6-816F-3879F97B5CBC}" type="slidenum">
-              <a:rPr lang="en-US"/>
-              <a:t>7</a:t>
-            </a:fld>
-            <a:endParaRPr lang="en-US"/>
-          </a:p>
-        </p:txBody>
-      </p:sp>
-    </p:spTree>
-    <p:extLst>
-      <p:ext uri="{BB962C8B-B14F-4D97-AF65-F5344CB8AC3E}">
-        <p14:creationId xmlns:p14="http://schemas.microsoft.com/office/powerpoint/2010/main" val="1024086991"/>
-      </p:ext>
-    </p:extLst>
-  </p:cSld>
-  <p:clrMapOvr>
-    <a:masterClrMapping/>
-  </p:clrMapOvr>
-</p:notes>
-</file>
-
-<file path=ppt/notesSlides/notesSlide8.xml><?xml version="1.0" encoding="utf-8"?>
-<p:notes xmlns:a="http://schemas.openxmlformats.org/drawingml/2006/main" xmlns:r="http://schemas.openxmlformats.org/officeDocument/2006/relationships" xmlns:p="http://schemas.openxmlformats.org/presentationml/2006/main">
-  <p:cSld>
-    <p:spTree>
-      <p:nvGrpSpPr>
-        <p:cNvPr id="1" name=""/>
-        <p:cNvGrpSpPr/>
-        <p:nvPr/>
-      </p:nvGrpSpPr>
-      <p:grpSpPr>
-        <a:xfrm>
-          <a:off x="0" y="0"/>
-          <a:ext cx="0" cy="0"/>
-          <a:chOff x="0" y="0"/>
-          <a:chExt cx="0" cy="0"/>
-        </a:xfrm>
-      </p:grpSpPr>
-      <p:sp>
-        <p:nvSpPr>
-          <p:cNvPr id="2" name="Slide Image Placeholder 1"/>
-          <p:cNvSpPr>
-            <a:spLocks noGrp="1" noRot="1" noChangeAspect="1"/>
-          </p:cNvSpPr>
-          <p:nvPr>
-            <p:ph type="sldImg"/>
-          </p:nvPr>
-        </p:nvSpPr>
-        <p:spPr/>
-      </p:sp>
-      <p:sp>
-        <p:nvSpPr>
-          <p:cNvPr id="3" name="Notes Placeholder 2"/>
-          <p:cNvSpPr>
-            <a:spLocks noGrp="1"/>
-          </p:cNvSpPr>
-          <p:nvPr>
-            <p:ph type="body" idx="1"/>
-          </p:nvPr>
-        </p:nvSpPr>
-        <p:spPr/>
-        <p:txBody>
-          <a:bodyPr/>
-          <a:lstStyle/>
-          <a:p>
-            <a:r>
-              <a:rPr lang="en-US" dirty="0"/>
-              <a:t/>
-            </a:r>
-            <a:endParaRPr lang="en-US" dirty="0"/>
-          </a:p>
-        </p:txBody>
-      </p:sp>
-      <p:sp>
-        <p:nvSpPr>
-          <p:cNvPr id="4" name="Slide Number Placeholder 3"/>
-          <p:cNvSpPr>
-            <a:spLocks noGrp="1"/>
-          </p:cNvSpPr>
-          <p:nvPr>
-            <p:ph type="sldNum" sz="quarter" idx="10"/>
-          </p:nvPr>
-        </p:nvSpPr>
-        <p:spPr/>
-        <p:txBody>
-          <a:bodyPr/>
-          <a:lstStyle/>
-          <a:p>
-            <a:fld id="{F7021451-1387-4CA6-816F-3879F97B5CBC}" type="slidenum">
-              <a:rPr lang="en-US"/>
-              <a:t>8</a:t>
-            </a:fld>
-            <a:endParaRPr lang="en-US"/>
-          </a:p>
-        </p:txBody>
-      </p:sp>
-    </p:spTree>
-    <p:extLst>
-      <p:ext uri="{BB962C8B-B14F-4D97-AF65-F5344CB8AC3E}">
-        <p14:creationId xmlns:p14="http://schemas.microsoft.com/office/powerpoint/2010/main" val="1024086991"/>
-      </p:ext>
-    </p:extLst>
-  </p:cSld>
-  <p:clrMapOvr>
-    <a:masterClrMapping/>
-  </p:clrMapOvr>
-</p:notes>
-</file>
-
-<file path=ppt/notesSlides/notesSlide9.xml><?xml version="1.0" encoding="utf-8"?>
-<p:notes xmlns:a="http://schemas.openxmlformats.org/drawingml/2006/main" xmlns:r="http://schemas.openxmlformats.org/officeDocument/2006/relationships" xmlns:p="http://schemas.openxmlformats.org/presentationml/2006/main">
-  <p:cSld>
-    <p:spTree>
-      <p:nvGrpSpPr>
-        <p:cNvPr id="1" name=""/>
-        <p:cNvGrpSpPr/>
-        <p:nvPr/>
-      </p:nvGrpSpPr>
-      <p:grpSpPr>
-        <a:xfrm>
-          <a:off x="0" y="0"/>
-          <a:ext cx="0" cy="0"/>
-          <a:chOff x="0" y="0"/>
-          <a:chExt cx="0" cy="0"/>
-        </a:xfrm>
-      </p:grpSpPr>
-      <p:sp>
-        <p:nvSpPr>
-          <p:cNvPr id="2" name="Slide Image Placeholder 1"/>
-          <p:cNvSpPr>
-            <a:spLocks noGrp="1" noRot="1" noChangeAspect="1"/>
-          </p:cNvSpPr>
-          <p:nvPr>
-            <p:ph type="sldImg"/>
-          </p:nvPr>
-        </p:nvSpPr>
-        <p:spPr/>
-      </p:sp>
-      <p:sp>
-        <p:nvSpPr>
-          <p:cNvPr id="3" name="Notes Placeholder 2"/>
-          <p:cNvSpPr>
-            <a:spLocks noGrp="1"/>
-          </p:cNvSpPr>
-          <p:nvPr>
-            <p:ph type="body" idx="1"/>
-          </p:nvPr>
-        </p:nvSpPr>
-        <p:spPr/>
-        <p:txBody>
-          <a:bodyPr/>
-          <a:lstStyle/>
-          <a:p>
-            <a:r>
-              <a:rPr lang="en-US" dirty="0"/>
-              <a:t/>
-            </a:r>
-            <a:endParaRPr lang="en-US" dirty="0"/>
-          </a:p>
-        </p:txBody>
-      </p:sp>
-      <p:sp>
-        <p:nvSpPr>
-          <p:cNvPr id="4" name="Slide Number Placeholder 3"/>
-          <p:cNvSpPr>
-            <a:spLocks noGrp="1"/>
-          </p:cNvSpPr>
-          <p:nvPr>
-            <p:ph type="sldNum" sz="quarter" idx="10"/>
-          </p:nvPr>
-        </p:nvSpPr>
-        <p:spPr/>
-        <p:txBody>
-          <a:bodyPr/>
-          <a:lstStyle/>
-          <a:p>
-            <a:fld id="{F7021451-1387-4CA6-816F-3879F97B5CBC}" type="slidenum">
-              <a:rPr lang="en-US"/>
-              <a:t>9</a:t>
-            </a:fld>
-            <a:endParaRPr lang="en-US"/>
-          </a:p>
-        </p:txBody>
-      </p:sp>
-    </p:spTree>
-    <p:extLst>
-      <p:ext uri="{BB962C8B-B14F-4D97-AF65-F5344CB8AC3E}">
-        <p14:creationId xmlns:p14="http://schemas.microsoft.com/office/powerpoint/2010/main" val="1024086991"/>
-      </p:ext>
-    </p:extLst>
-  </p:cSld>
-  <p:clrMapOvr>
-    <a:masterClrMapping/>
-  </p:clrMapOvr>
-</p:notes>
-</file>
-
 <file path=ppt/slideLayouts/slideLayout1.xml><?xml version="1.0" encoding="utf-8"?>
 <p:sldLayout xmlns:a="http://schemas.openxmlformats.org/drawingml/2006/main" xmlns:r="http://schemas.openxmlformats.org/officeDocument/2006/relationships" xmlns:p="http://schemas.openxmlformats.org/presentationml/2006/main" preserve="1">
   <p:cSld name="DEFAULT">
@@ -1288,7 +1021,7 @@
 
 <file path=ppt/slideLayouts/slideLayout2.xml><?xml version="1.0" encoding="utf-8"?>
 <p:sldLayout xmlns:a="http://schemas.openxmlformats.org/drawingml/2006/main" xmlns:r="http://schemas.openxmlformats.org/officeDocument/2006/relationships" xmlns:p="http://schemas.openxmlformats.org/presentationml/2006/main" preserve="1">
-  <p:cSld name="MASTER_SLIDE">
+  <p:cSld name="MASTER_STANDARD">
     <p:bg>
       <p:bgPr>
         <a:solidFill>
@@ -1312,14 +1045,34 @@
       </p:grpSpPr>
       <p:sp>
         <p:nvSpPr>
-          <p:cNvPr id="2" name="Text 0"/>
+          <p:cNvPr id="2" name="Shape 0"/>
+          <p:cNvSpPr/>
+          <p:nvPr/>
+        </p:nvSpPr>
+        <p:spPr>
+          <a:xfrm>
+            <a:off x="0" y="0"/>
+            <a:ext cx="9144000" cy="45720"/>
+          </a:xfrm>
+          <a:prstGeom prst="rect">
+            <a:avLst/>
+          </a:prstGeom>
+          <a:solidFill>
+            <a:srgbClr val="06B6D4"/>
+          </a:solidFill>
+          <a:ln/>
+        </p:spPr>
+      </p:sp>
+      <p:sp>
+        <p:nvSpPr>
+          <p:cNvPr id="3" name="Text 1"/>
           <p:cNvSpPr/>
           <p:nvPr/>
         </p:nvSpPr>
         <p:spPr>
           <a:xfrm>
             <a:off x="457200" y="274320"/>
-            <a:ext cx="1828800" cy="0"/>
+            <a:ext cx="1828800" cy="457200"/>
           </a:xfrm>
           <a:prstGeom prst="rect">
             <a:avLst/>
@@ -1335,7 +1088,7 @@
               <a:buNone/>
             </a:pPr>
             <a:r>
-              <a:rPr lang="en-US" sz="1800" b="1" dirty="0">
+              <a:rPr lang="en-US" sz="1600" b="1" dirty="0">
                 <a:solidFill>
                   <a:srgbClr val="06B6D4"/>
                 </a:solidFill>
@@ -1345,20 +1098,20 @@
               </a:rPr>
               <a:t>UBBEE</a:t>
             </a:r>
-            <a:endParaRPr lang="en-US" sz="1800" dirty="0"/>
-          </a:p>
-        </p:txBody>
-      </p:sp>
-      <p:sp>
-        <p:nvSpPr>
-          <p:cNvPr id="3" name="Text 1"/>
-          <p:cNvSpPr/>
-          <p:nvPr/>
-        </p:nvSpPr>
-        <p:spPr>
-          <a:xfrm>
-            <a:off x="457200" y="6217920"/>
-            <a:ext cx="4572000" cy="0"/>
+            <a:endParaRPr lang="en-US" sz="1600" dirty="0"/>
+          </a:p>
+        </p:txBody>
+      </p:sp>
+      <p:sp>
+        <p:nvSpPr>
+          <p:cNvPr id="4" name="Text 2"/>
+          <p:cNvSpPr/>
+          <p:nvPr/>
+        </p:nvSpPr>
+        <p:spPr>
+          <a:xfrm>
+            <a:off x="457200" y="4754880"/>
+            <a:ext cx="4572000" cy="274320"/>
           </a:xfrm>
           <a:prstGeom prst="rect">
             <a:avLst/>
@@ -1374,14 +1127,14 @@
               <a:buNone/>
             </a:pPr>
             <a:r>
-              <a:rPr lang="en-US" sz="1000" dirty="0">
-                <a:solidFill>
-                  <a:srgbClr val="64748B"/>
+              <a:rPr lang="en-US" sz="900" dirty="0">
+                <a:solidFill>
+                  <a:srgbClr val="334155"/>
                 </a:solidFill>
               </a:rPr>
               <a:t>© 2026 UBBEE - Tous droits réservés.</a:t>
             </a:r>
-            <a:endParaRPr lang="en-US" sz="1000" dirty="0"/>
+            <a:endParaRPr lang="en-US" sz="900" dirty="0"/>
           </a:p>
         </p:txBody>
       </p:sp>
@@ -1688,16 +1441,39 @@
           <a:chExt cx="0" cy="0"/>
         </a:xfrm>
       </p:grpSpPr>
-      <p:sp>
-        <p:nvSpPr>
-          <p:cNvPr id="2" name="Text 0"/>
-          <p:cNvSpPr/>
-          <p:nvPr/>
-        </p:nvSpPr>
-        <p:spPr>
-          <a:xfrm>
-            <a:off x="457200" y="1828800"/>
-            <a:ext cx="8229600" cy="0"/>
+      <p:pic>
+        <p:nvPicPr>
+          <p:cNvPr id="2" name="Image 0" descr="C:/Users/taouf/Documents/antigravity lab/smart-building/frontend/public/marketing/hero_isometric.png">    </p:cNvPr>
+          <p:cNvPicPr>
+            <a:picLocks noChangeAspect="1"/>
+          </p:cNvPicPr>
+          <p:nvPr/>
+        </p:nvPicPr>
+        <p:blipFill>
+          <a:blip r:embed="rId1"/>
+          <a:srcRect l="0" r="0" t="0" b="0"/>
+          <a:stretch/>
+        </p:blipFill>
+        <p:spPr>
+          <a:xfrm>
+            <a:off x="4114800" y="457200"/>
+            <a:ext cx="5029200" cy="4686300"/>
+          </a:xfrm>
+          <a:prstGeom prst="rect">
+            <a:avLst/>
+          </a:prstGeom>
+        </p:spPr>
+      </p:pic>
+      <p:sp>
+        <p:nvSpPr>
+          <p:cNvPr id="3" name="Text 0"/>
+          <p:cNvSpPr/>
+          <p:nvPr/>
+        </p:nvSpPr>
+        <p:spPr>
+          <a:xfrm>
+            <a:off x="457200" y="1371600"/>
+            <a:ext cx="3657600" cy="914400"/>
           </a:xfrm>
           <a:prstGeom prst="rect">
             <a:avLst/>
@@ -1713,27 +1489,27 @@
               <a:buNone/>
             </a:pPr>
             <a:r>
-              <a:rPr lang="en-US" sz="6000" b="1" dirty="0">
+              <a:rPr lang="en-US" sz="5400" b="1" dirty="0">
                 <a:solidFill>
                   <a:srgbClr val="FFFFFF"/>
                 </a:solidFill>
               </a:rPr>
               <a:t>UBBEE</a:t>
             </a:r>
-            <a:endParaRPr lang="en-US" sz="6000" dirty="0"/>
-          </a:p>
-        </p:txBody>
-      </p:sp>
-      <p:sp>
-        <p:nvSpPr>
-          <p:cNvPr id="3" name="Text 1"/>
-          <p:cNvSpPr/>
-          <p:nvPr/>
-        </p:nvSpPr>
-        <p:spPr>
-          <a:xfrm>
-            <a:off x="457200" y="2926080"/>
-            <a:ext cx="8229600" cy="0"/>
+            <a:endParaRPr lang="en-US" sz="5400" dirty="0"/>
+          </a:p>
+        </p:txBody>
+      </p:sp>
+      <p:sp>
+        <p:nvSpPr>
+          <p:cNvPr id="4" name="Text 1"/>
+          <p:cNvSpPr/>
+          <p:nvPr/>
+        </p:nvSpPr>
+        <p:spPr>
+          <a:xfrm>
+            <a:off x="457200" y="2286000"/>
+            <a:ext cx="4114800" cy="1097280"/>
           </a:xfrm>
           <a:prstGeom prst="rect">
             <a:avLst/>
@@ -1749,27 +1525,41 @@
               <a:buNone/>
             </a:pPr>
             <a:r>
-              <a:rPr lang="en-US" sz="3200" dirty="0">
+              <a:rPr lang="en-US" sz="3200" b="1" dirty="0">
                 <a:solidFill>
                   <a:srgbClr val="06B6D4"/>
                 </a:solidFill>
               </a:rPr>
-              <a:t>Donnez vie à vos bâtiments, sans coder.</a:t>
+              <a:t>Donnez vie à vos</a:t>
             </a:r>
             <a:endParaRPr lang="en-US" sz="3200" dirty="0"/>
           </a:p>
-        </p:txBody>
-      </p:sp>
-      <p:sp>
-        <p:nvSpPr>
-          <p:cNvPr id="4" name="Text 2"/>
-          <p:cNvSpPr/>
-          <p:nvPr/>
-        </p:nvSpPr>
-        <p:spPr>
-          <a:xfrm>
-            <a:off x="457200" y="3657600"/>
-            <a:ext cx="7315200" cy="0"/>
+          <a:p>
+            <a:pPr indent="0" marL="0">
+              <a:buNone/>
+            </a:pPr>
+            <a:r>
+              <a:rPr lang="en-US" sz="3200" b="1" dirty="0">
+                <a:solidFill>
+                  <a:srgbClr val="06B6D4"/>
+                </a:solidFill>
+              </a:rPr>
+              <a:t>bâtiments, sans coder.</a:t>
+            </a:r>
+            <a:endParaRPr lang="en-US" sz="3200" dirty="0"/>
+          </a:p>
+        </p:txBody>
+      </p:sp>
+      <p:sp>
+        <p:nvSpPr>
+          <p:cNvPr id="5" name="Text 2"/>
+          <p:cNvSpPr/>
+          <p:nvPr/>
+        </p:nvSpPr>
+        <p:spPr>
+          <a:xfrm>
+            <a:off x="457200" y="3474720"/>
+            <a:ext cx="4114800" cy="914400"/>
           </a:xfrm>
           <a:prstGeom prst="rect">
             <a:avLst/>
@@ -1782,17 +1572,20 @@
           <a:lstStyle/>
           <a:p>
             <a:pPr indent="0" marL="0">
-              <a:buNone/>
-            </a:pPr>
-            <a:r>
-              <a:rPr lang="en-US" sz="1800" dirty="0">
-                <a:solidFill>
-                  <a:srgbClr val="CBD5E1"/>
+              <a:lnSpc>
+                <a:spcPts val="2200"/>
+              </a:lnSpc>
+              <a:buNone/>
+            </a:pPr>
+            <a:r>
+              <a:rPr lang="en-US" sz="1600" dirty="0">
+                <a:solidFill>
+                  <a:srgbClr val="94A3B8"/>
                 </a:solidFill>
               </a:rPr>
               <a:t>La première plateforme GTB SaaS Plug &amp; Play qui transforme l'énergie en performance via le Jumeau Numérique.</a:t>
             </a:r>
-            <a:endParaRPr lang="en-US" sz="1800" dirty="0"/>
+            <a:endParaRPr lang="en-US" sz="1600" dirty="0"/>
           </a:p>
         </p:txBody>
       </p:sp>
@@ -1829,8 +1622,8 @@
         </p:nvSpPr>
         <p:spPr>
           <a:xfrm>
-            <a:off x="457200" y="914400"/>
-            <a:ext cx="8229600" cy="0"/>
+            <a:off x="457200" y="731520"/>
+            <a:ext cx="8229600" cy="731520"/>
           </a:xfrm>
           <a:prstGeom prst="rect">
             <a:avLst/>
@@ -1859,14 +1652,39 @@
       </p:sp>
       <p:sp>
         <p:nvSpPr>
-          <p:cNvPr id="3" name="Text 1"/>
-          <p:cNvSpPr/>
-          <p:nvPr/>
-        </p:nvSpPr>
-        <p:spPr>
-          <a:xfrm>
-            <a:off x="457200" y="2286000"/>
-            <a:ext cx="7315200" cy="0"/>
+          <p:cNvPr id="3" name="Shape 1"/>
+          <p:cNvSpPr/>
+          <p:nvPr/>
+        </p:nvSpPr>
+        <p:spPr>
+          <a:xfrm>
+            <a:off x="457200" y="1828800"/>
+            <a:ext cx="2560320" cy="2286000"/>
+          </a:xfrm>
+          <a:prstGeom prst="rect">
+            <a:avLst/>
+          </a:prstGeom>
+          <a:solidFill>
+            <a:srgbClr val="1E293B"/>
+          </a:solidFill>
+          <a:ln w="12700">
+            <a:solidFill>
+              <a:srgbClr val="06B6D4"/>
+            </a:solidFill>
+            <a:prstDash val="solid"/>
+          </a:ln>
+        </p:spPr>
+      </p:sp>
+      <p:sp>
+        <p:nvSpPr>
+          <p:cNvPr id="4" name="Text 2"/>
+          <p:cNvSpPr/>
+          <p:nvPr/>
+        </p:nvSpPr>
+        <p:spPr>
+          <a:xfrm>
+            <a:off x="457200" y="2011680"/>
+            <a:ext cx="2560320" cy="457200"/>
           </a:xfrm>
           <a:prstGeom prst="rect">
             <a:avLst/>
@@ -1878,93 +1696,238 @@
           <a:bodyPr wrap="square" rtlCol="0" anchor="ctr"/>
           <a:lstStyle/>
           <a:p>
-            <a:pPr indent="0" marL="0">
-              <a:lnSpc>
-                <a:spcPts val="3500"/>
-              </a:lnSpc>
-              <a:buNone/>
-            </a:pPr>
-            <a:r>
-              <a:rPr lang="en-US" sz="2000" b="1" dirty="0">
+            <a:pPr algn="ctr" indent="0" marL="0">
+              <a:buNone/>
+            </a:pPr>
+            <a:r>
+              <a:rPr lang="en-US" sz="1800" b="1" dirty="0">
                 <a:solidFill>
                   <a:srgbClr val="06B6D4"/>
                 </a:solidFill>
               </a:rPr>
-              <a:t>1. Décret Tertiaire : </a:t>
-            </a:r>
-            <a:pPr indent="0" marL="0">
-              <a:lnSpc>
-                <a:spcPts val="3500"/>
-              </a:lnSpc>
-              <a:buNone/>
-            </a:pPr>
-            <a:r>
-              <a:rPr lang="en-US" sz="2000" dirty="0">
-                <a:solidFill>
-                  <a:srgbClr val="F8FAFC"/>
-                </a:solidFill>
-              </a:rPr>
-              <a:t>Des obligations légales avec des pénalités lourdes.
-</a:t>
-            </a:r>
-            <a:pPr indent="0" marL="0">
-              <a:lnSpc>
-                <a:spcPts val="3500"/>
-              </a:lnSpc>
-              <a:buNone/>
-            </a:pPr>
-            <a:r>
-              <a:rPr lang="en-US" sz="2000" b="1" dirty="0">
+              <a:t>1. Décret Tertiaire</a:t>
+            </a:r>
+            <a:endParaRPr lang="en-US" sz="1800" dirty="0"/>
+          </a:p>
+        </p:txBody>
+      </p:sp>
+      <p:sp>
+        <p:nvSpPr>
+          <p:cNvPr id="5" name="Text 3"/>
+          <p:cNvSpPr/>
+          <p:nvPr/>
+        </p:nvSpPr>
+        <p:spPr>
+          <a:xfrm>
+            <a:off x="640080" y="2560320"/>
+            <a:ext cx="2194560" cy="1371600"/>
+          </a:xfrm>
+          <a:prstGeom prst="rect">
+            <a:avLst/>
+          </a:prstGeom>
+          <a:noFill/>
+          <a:ln/>
+        </p:spPr>
+        <p:txBody>
+          <a:bodyPr wrap="square" rtlCol="0" anchor="ctr"/>
+          <a:lstStyle/>
+          <a:p>
+            <a:pPr algn="ctr" indent="0" marL="0">
+              <a:buNone/>
+            </a:pPr>
+            <a:r>
+              <a:rPr lang="en-US" sz="1400" dirty="0">
+                <a:solidFill>
+                  <a:srgbClr val="FFFFFF"/>
+                </a:solidFill>
+              </a:rPr>
+              <a:t>Des obligations légales de réduction énergétique avec des pénalités lourdes.</a:t>
+            </a:r>
+            <a:endParaRPr lang="en-US" sz="1400" dirty="0"/>
+          </a:p>
+        </p:txBody>
+      </p:sp>
+      <p:sp>
+        <p:nvSpPr>
+          <p:cNvPr id="6" name="Shape 4"/>
+          <p:cNvSpPr/>
+          <p:nvPr/>
+        </p:nvSpPr>
+        <p:spPr>
+          <a:xfrm>
+            <a:off x="3291840" y="1828800"/>
+            <a:ext cx="2560320" cy="2286000"/>
+          </a:xfrm>
+          <a:prstGeom prst="rect">
+            <a:avLst/>
+          </a:prstGeom>
+          <a:solidFill>
+            <a:srgbClr val="1E293B"/>
+          </a:solidFill>
+          <a:ln/>
+        </p:spPr>
+      </p:sp>
+      <p:sp>
+        <p:nvSpPr>
+          <p:cNvPr id="7" name="Text 5"/>
+          <p:cNvSpPr/>
+          <p:nvPr/>
+        </p:nvSpPr>
+        <p:spPr>
+          <a:xfrm>
+            <a:off x="3291840" y="2011680"/>
+            <a:ext cx="2560320" cy="457200"/>
+          </a:xfrm>
+          <a:prstGeom prst="rect">
+            <a:avLst/>
+          </a:prstGeom>
+          <a:noFill/>
+          <a:ln/>
+        </p:spPr>
+        <p:txBody>
+          <a:bodyPr wrap="square" rtlCol="0" anchor="ctr"/>
+          <a:lstStyle/>
+          <a:p>
+            <a:pPr algn="ctr" indent="0" marL="0">
+              <a:buNone/>
+            </a:pPr>
+            <a:r>
+              <a:rPr lang="en-US" sz="1800" b="1" dirty="0">
                 <a:solidFill>
                   <a:srgbClr val="06B6D4"/>
                 </a:solidFill>
               </a:rPr>
-              <a:t>2. Silos de Données : </a:t>
-            </a:r>
-            <a:pPr indent="0" marL="0">
-              <a:lnSpc>
-                <a:spcPts val="3500"/>
-              </a:lnSpc>
-              <a:buNone/>
-            </a:pPr>
-            <a:r>
-              <a:rPr lang="en-US" sz="2000" dirty="0">
-                <a:solidFill>
-                  <a:srgbClr val="F8FAFC"/>
-                </a:solidFill>
-              </a:rPr>
-              <a:t>Chauffage, Éclairage, Présence... Les anciens systèmes ne communiquent pas.
-</a:t>
-            </a:r>
-            <a:pPr indent="0" marL="0">
-              <a:lnSpc>
-                <a:spcPts val="3500"/>
-              </a:lnSpc>
-              <a:buNone/>
-            </a:pPr>
-            <a:r>
-              <a:rPr lang="en-US" sz="2000" b="1" dirty="0">
+              <a:t>2. Silos de Données</a:t>
+            </a:r>
+            <a:endParaRPr lang="en-US" sz="1800" dirty="0"/>
+          </a:p>
+        </p:txBody>
+      </p:sp>
+      <p:sp>
+        <p:nvSpPr>
+          <p:cNvPr id="8" name="Text 6"/>
+          <p:cNvSpPr/>
+          <p:nvPr/>
+        </p:nvSpPr>
+        <p:spPr>
+          <a:xfrm>
+            <a:off x="3474720" y="2560320"/>
+            <a:ext cx="2194560" cy="1371600"/>
+          </a:xfrm>
+          <a:prstGeom prst="rect">
+            <a:avLst/>
+          </a:prstGeom>
+          <a:noFill/>
+          <a:ln/>
+        </p:spPr>
+        <p:txBody>
+          <a:bodyPr wrap="square" rtlCol="0" anchor="ctr"/>
+          <a:lstStyle/>
+          <a:p>
+            <a:pPr algn="ctr" indent="0" marL="0">
+              <a:buNone/>
+            </a:pPr>
+            <a:r>
+              <a:rPr lang="en-US" sz="1400" dirty="0">
+                <a:solidFill>
+                  <a:srgbClr val="FFFFFF"/>
+                </a:solidFill>
+              </a:rPr>
+              <a:t>Les anciens systèmes (GTB/GTC) sont fermés et ne se parlent pas.</a:t>
+            </a:r>
+            <a:endParaRPr lang="en-US" sz="1400" dirty="0"/>
+          </a:p>
+        </p:txBody>
+      </p:sp>
+      <p:sp>
+        <p:nvSpPr>
+          <p:cNvPr id="9" name="Shape 7"/>
+          <p:cNvSpPr/>
+          <p:nvPr/>
+        </p:nvSpPr>
+        <p:spPr>
+          <a:xfrm>
+            <a:off x="6126480" y="1828800"/>
+            <a:ext cx="2560320" cy="2286000"/>
+          </a:xfrm>
+          <a:prstGeom prst="rect">
+            <a:avLst/>
+          </a:prstGeom>
+          <a:solidFill>
+            <a:srgbClr val="1E293B"/>
+          </a:solidFill>
+          <a:ln/>
+        </p:spPr>
+      </p:sp>
+      <p:sp>
+        <p:nvSpPr>
+          <p:cNvPr id="10" name="Text 8"/>
+          <p:cNvSpPr/>
+          <p:nvPr/>
+        </p:nvSpPr>
+        <p:spPr>
+          <a:xfrm>
+            <a:off x="6126480" y="2011680"/>
+            <a:ext cx="2560320" cy="457200"/>
+          </a:xfrm>
+          <a:prstGeom prst="rect">
+            <a:avLst/>
+          </a:prstGeom>
+          <a:noFill/>
+          <a:ln/>
+        </p:spPr>
+        <p:txBody>
+          <a:bodyPr wrap="square" rtlCol="0" anchor="ctr"/>
+          <a:lstStyle/>
+          <a:p>
+            <a:pPr algn="ctr" indent="0" marL="0">
+              <a:buNone/>
+            </a:pPr>
+            <a:r>
+              <a:rPr lang="en-US" sz="1800" b="1" dirty="0">
                 <a:solidFill>
                   <a:srgbClr val="06B6D4"/>
                 </a:solidFill>
               </a:rPr>
-              <a:t>3. Déploiement Lourd : </a:t>
-            </a:r>
-            <a:pPr indent="0" marL="0">
-              <a:lnSpc>
-                <a:spcPts val="3500"/>
-              </a:lnSpc>
-              <a:buNone/>
-            </a:pPr>
-            <a:r>
-              <a:rPr lang="en-US" sz="2000" dirty="0">
-                <a:solidFill>
-                  <a:srgbClr val="F8FAFC"/>
-                </a:solidFill>
-              </a:rPr>
-              <a:t>Moderniser un bâtiment coûte des mois de travaux et des milliers d'euros en intégration.</a:t>
-            </a:r>
-            <a:endParaRPr lang="en-US" sz="2000" dirty="0"/>
+              <a:t>3. Déploiement Lourd</a:t>
+            </a:r>
+            <a:endParaRPr lang="en-US" sz="1800" dirty="0"/>
+          </a:p>
+        </p:txBody>
+      </p:sp>
+      <p:sp>
+        <p:nvSpPr>
+          <p:cNvPr id="11" name="Text 9"/>
+          <p:cNvSpPr/>
+          <p:nvPr/>
+        </p:nvSpPr>
+        <p:spPr>
+          <a:xfrm>
+            <a:off x="6309360" y="2560320"/>
+            <a:ext cx="2194560" cy="1371600"/>
+          </a:xfrm>
+          <a:prstGeom prst="rect">
+            <a:avLst/>
+          </a:prstGeom>
+          <a:noFill/>
+          <a:ln/>
+        </p:spPr>
+        <p:txBody>
+          <a:bodyPr wrap="square" rtlCol="0" anchor="ctr"/>
+          <a:lstStyle/>
+          <a:p>
+            <a:pPr algn="ctr" indent="0" marL="0">
+              <a:buNone/>
+            </a:pPr>
+            <a:r>
+              <a:rPr lang="en-US" sz="1400" dirty="0">
+                <a:solidFill>
+                  <a:srgbClr val="FFFFFF"/>
+                </a:solidFill>
+              </a:rPr>
+              <a:t>Moderniser coûte des mois de travaux et des milliers d'euros en intégration réseau.</a:t>
+            </a:r>
+            <a:endParaRPr lang="en-US" sz="1400" dirty="0"/>
           </a:p>
         </p:txBody>
       </p:sp>
@@ -1993,16 +1956,39 @@
           <a:chExt cx="0" cy="0"/>
         </a:xfrm>
       </p:grpSpPr>
-      <p:sp>
-        <p:nvSpPr>
-          <p:cNvPr id="2" name="Text 0"/>
-          <p:cNvSpPr/>
-          <p:nvPr/>
-        </p:nvSpPr>
-        <p:spPr>
-          <a:xfrm>
-            <a:off x="457200" y="914400"/>
-            <a:ext cx="8229600" cy="0"/>
+      <p:pic>
+        <p:nvPicPr>
+          <p:cNvPr id="2" name="Image 0" descr="C:/Users/taouf/Documents/antigravity lab/smart-building/frontend/public/marketing/globe_data.png">    </p:cNvPr>
+          <p:cNvPicPr>
+            <a:picLocks noChangeAspect="1"/>
+          </p:cNvPicPr>
+          <p:nvPr/>
+        </p:nvPicPr>
+        <p:blipFill>
+          <a:blip r:embed="rId1"/>
+          <a:srcRect l="0" r="0" t="0" b="0"/>
+          <a:stretch/>
+        </p:blipFill>
+        <p:spPr>
+          <a:xfrm>
+            <a:off x="0" y="1371600"/>
+            <a:ext cx="4572000" cy="3657600"/>
+          </a:xfrm>
+          <a:prstGeom prst="rect">
+            <a:avLst/>
+          </a:prstGeom>
+        </p:spPr>
+      </p:pic>
+      <p:sp>
+        <p:nvSpPr>
+          <p:cNvPr id="3" name="Text 0"/>
+          <p:cNvSpPr/>
+          <p:nvPr/>
+        </p:nvSpPr>
+        <p:spPr>
+          <a:xfrm>
+            <a:off x="4114800" y="914400"/>
+            <a:ext cx="4572000" cy="731520"/>
           </a:xfrm>
           <a:prstGeom prst="rect">
             <a:avLst/>
@@ -2018,27 +2004,27 @@
               <a:buNone/>
             </a:pPr>
             <a:r>
-              <a:rPr lang="en-US" sz="3600" b="1" dirty="0">
+              <a:rPr lang="en-US" sz="3200" b="1" dirty="0">
                 <a:solidFill>
                   <a:srgbClr val="FFFFFF"/>
                 </a:solidFill>
               </a:rPr>
-              <a:t>Une intelligence logicielle fluide qui s'adapte à votre existant.</a:t>
-            </a:r>
-            <a:endParaRPr lang="en-US" sz="3600" dirty="0"/>
-          </a:p>
-        </p:txBody>
-      </p:sp>
-      <p:sp>
-        <p:nvSpPr>
-          <p:cNvPr id="3" name="Text 1"/>
-          <p:cNvSpPr/>
-          <p:nvPr/>
-        </p:nvSpPr>
-        <p:spPr>
-          <a:xfrm>
-            <a:off x="457200" y="2011680"/>
-            <a:ext cx="6858000" cy="0"/>
+              <a:t>Vos données, enfin parlantes.</a:t>
+            </a:r>
+            <a:endParaRPr lang="en-US" sz="3200" dirty="0"/>
+          </a:p>
+        </p:txBody>
+      </p:sp>
+      <p:sp>
+        <p:nvSpPr>
+          <p:cNvPr id="4" name="Text 1"/>
+          <p:cNvSpPr/>
+          <p:nvPr/>
+        </p:nvSpPr>
+        <p:spPr>
+          <a:xfrm>
+            <a:off x="4114800" y="1828800"/>
+            <a:ext cx="4572000" cy="731520"/>
           </a:xfrm>
           <a:prstGeom prst="rect">
             <a:avLst/>
@@ -2054,27 +2040,27 @@
               <a:buNone/>
             </a:pPr>
             <a:r>
-              <a:rPr lang="en-US" sz="2400" b="1" dirty="0">
+              <a:rPr lang="en-US" sz="2000" b="1" dirty="0">
                 <a:solidFill>
                   <a:srgbClr val="06B6D4"/>
                 </a:solidFill>
               </a:rPr>
-              <a:t>Pourquoi UBBEE ?</a:t>
-            </a:r>
-            <a:endParaRPr lang="en-US" sz="2400" dirty="0"/>
-          </a:p>
-        </p:txBody>
-      </p:sp>
-      <p:sp>
-        <p:nvSpPr>
-          <p:cNvPr id="4" name="Text 2"/>
-          <p:cNvSpPr/>
-          <p:nvPr/>
-        </p:nvSpPr>
-        <p:spPr>
-          <a:xfrm>
-            <a:off x="457200" y="2743200"/>
-            <a:ext cx="7315200" cy="0"/>
+              <a:t>La puissance d'un Jumeau Numérique 3D accessible depuis un simple navigateur web.</a:t>
+            </a:r>
+            <a:endParaRPr lang="en-US" sz="2000" dirty="0"/>
+          </a:p>
+        </p:txBody>
+      </p:sp>
+      <p:sp>
+        <p:nvSpPr>
+          <p:cNvPr id="5" name="Text 2"/>
+          <p:cNvSpPr/>
+          <p:nvPr/>
+        </p:nvSpPr>
+        <p:spPr>
+          <a:xfrm>
+            <a:off x="4114800" y="2743200"/>
+            <a:ext cx="4572000" cy="1828800"/>
           </a:xfrm>
           <a:prstGeom prst="rect">
             <a:avLst/>
@@ -2086,49 +2072,54 @@
           <a:bodyPr wrap="square" rtlCol="0" anchor="ctr"/>
           <a:lstStyle/>
           <a:p>
-            <a:pPr marL="342900" indent="-342900">
-              <a:buSzPct val="100000"/>
-              <a:buChar char="•"/>
-            </a:pPr>
-            <a:r>
-              <a:rPr lang="en-US" sz="2000" dirty="0">
-                <a:solidFill>
-                  <a:srgbClr val="F8FAFC"/>
-                </a:solidFill>
-              </a:rPr>
-              <a:t>• Rapide : Déploiement en quelques heures.</a:t>
-            </a:r>
-            <a:endParaRPr lang="en-US" sz="2000" dirty="0"/>
-          </a:p>
-          <a:p>
-            <a:pPr marL="342900" indent="-342900">
-              <a:buSzPct val="100000"/>
-              <a:buChar char="•"/>
-            </a:pPr>
-            <a:r>
-              <a:rPr lang="en-US" sz="2000" dirty="0">
-                <a:solidFill>
-                  <a:srgbClr val="F8FAFC"/>
-                </a:solidFill>
-              </a:rPr>
-              <a:t>• Universel : Agnostique au matériel, lit tous les flux IoT.</a:t>
-            </a:r>
-            <a:endParaRPr lang="en-US" sz="2000" dirty="0"/>
-          </a:p>
-          <a:p>
-            <a:pPr marL="342900" indent="-342900">
-              <a:buSzPct val="100000"/>
-              <a:buChar char="•"/>
-            </a:pPr>
-            <a:r>
-              <a:rPr lang="en-US" sz="2000" dirty="0">
-                <a:solidFill>
-                  <a:srgbClr val="F8FAFC"/>
-                </a:solidFill>
-              </a:rPr>
-              <a:t>• Rentable : ROI &lt; 12 mois grâce au pilotage actif.</a:t>
-            </a:r>
-            <a:endParaRPr lang="en-US" sz="2000" dirty="0"/>
+            <a:pPr indent="0" marL="0">
+              <a:buNone/>
+            </a:pPr>
+            <a:r>
+              <a:rPr lang="en-US" sz="1600" b="1" dirty="0">
+                <a:solidFill>
+                  <a:srgbClr val="FFFFFF"/>
+                </a:solidFill>
+              </a:rPr>
+              <a:t>• Cartographie Thermique Instantanée
+</a:t>
+            </a:r>
+            <a:pPr indent="0" marL="0">
+              <a:buNone/>
+            </a:pPr>
+            <a:r>
+              <a:rPr lang="en-US" sz="1600" dirty="0">
+                <a:solidFill>
+                  <a:srgbClr val="94A3B8"/>
+                </a:solidFill>
+              </a:rPr>
+              <a:t>  Localisez immédiatement une fenêtre ouverte ou une zone en surchauffe.
+</a:t>
+            </a:r>
+            <a:pPr indent="0" marL="0">
+              <a:buNone/>
+            </a:pPr>
+            <a:r>
+              <a:rPr lang="en-US" sz="1600" b="1" dirty="0">
+                <a:solidFill>
+                  <a:srgbClr val="FFFFFF"/>
+                </a:solidFill>
+              </a:rPr>
+              <a:t>• Agnostique &amp; Universel
+</a:t>
+            </a:r>
+            <a:pPr indent="0" marL="0">
+              <a:buNone/>
+            </a:pPr>
+            <a:r>
+              <a:rPr lang="en-US" sz="1600" dirty="0">
+                <a:solidFill>
+                  <a:srgbClr val="94A3B8"/>
+                </a:solidFill>
+              </a:rPr>
+              <a:t>  UBBEE superpose les données de n'importe quel constructeur sur vos plans.</a:t>
+            </a:r>
+            <a:endParaRPr lang="en-US" sz="1600" dirty="0"/>
           </a:p>
         </p:txBody>
       </p:sp>
@@ -2166,7 +2157,7 @@
         <p:spPr>
           <a:xfrm>
             <a:off x="457200" y="914400"/>
-            <a:ext cx="8229600" cy="0"/>
+            <a:ext cx="4572000" cy="731520"/>
           </a:xfrm>
           <a:prstGeom prst="rect">
             <a:avLst/>
@@ -2182,14 +2173,14 @@
               <a:buNone/>
             </a:pPr>
             <a:r>
-              <a:rPr lang="en-US" sz="3600" b="1" dirty="0">
+              <a:rPr lang="en-US" sz="3200" b="1" dirty="0">
                 <a:solidFill>
                   <a:srgbClr val="FFFFFF"/>
                 </a:solidFill>
               </a:rPr>
-              <a:t>Oubliez les tableurs. Naviguez dans votre bâtiment.</a:t>
-            </a:r>
-            <a:endParaRPr lang="en-US" sz="3600" dirty="0"/>
+              <a:t>Branchez. Glissez. Pilotez.</a:t>
+            </a:r>
+            <a:endParaRPr lang="en-US" sz="3200" dirty="0"/>
           </a:p>
         </p:txBody>
       </p:sp>
@@ -2201,8 +2192,8 @@
         </p:nvSpPr>
         <p:spPr>
           <a:xfrm>
-            <a:off x="457200" y="2743200"/>
-            <a:ext cx="7315200" cy="1828800"/>
+            <a:off x="457200" y="1828800"/>
+            <a:ext cx="4114800" cy="548640"/>
           </a:xfrm>
           <a:prstGeom prst="rect">
             <a:avLst/>
@@ -2218,31 +2209,105 @@
               <a:buNone/>
             </a:pPr>
             <a:r>
-              <a:rPr lang="en-US" sz="2400" dirty="0">
-                <a:solidFill>
-                  <a:srgbClr val="CBD5E1"/>
-                </a:solidFill>
-              </a:rPr>
-              <a:t>UBBEE génère dynamiquement un Jumeau Numérique interactif de vos sites.</a:t>
-            </a:r>
-            <a:endParaRPr lang="en-US" sz="2400" dirty="0"/>
-          </a:p>
+              <a:rPr lang="en-US" sz="2000" b="1" dirty="0">
+                <a:solidFill>
+                  <a:srgbClr val="06B6D4"/>
+                </a:solidFill>
+              </a:rPr>
+              <a:t>Du capteur au tableau de bord en 3 clics, sans code.</a:t>
+            </a:r>
+            <a:endParaRPr lang="en-US" sz="2000" dirty="0"/>
+          </a:p>
+        </p:txBody>
+      </p:sp>
+      <p:sp>
+        <p:nvSpPr>
+          <p:cNvPr id="4" name="Text 2"/>
+          <p:cNvSpPr/>
+          <p:nvPr/>
+        </p:nvSpPr>
+        <p:spPr>
+          <a:xfrm>
+            <a:off x="457200" y="2560320"/>
+            <a:ext cx="4114800" cy="1371600"/>
+          </a:xfrm>
+          <a:prstGeom prst="rect">
+            <a:avLst/>
+          </a:prstGeom>
+          <a:noFill/>
+          <a:ln/>
+        </p:spPr>
+        <p:txBody>
+          <a:bodyPr wrap="square" rtlCol="0" anchor="ctr"/>
+          <a:lstStyle/>
           <a:p>
             <a:pPr indent="0" marL="0">
-              <a:buNone/>
-            </a:pPr>
-            <a:r>
-              <a:rPr lang="en-US" sz="2400" dirty="0">
-                <a:solidFill>
-                  <a:srgbClr val="CBD5E1"/>
-                </a:solidFill>
-              </a:rPr>
-              <a:t>Visualisez vos déperditions thermiques sous forme de cartes de chaleurs superposées à vos vrais plans.</a:t>
-            </a:r>
-            <a:endParaRPr lang="en-US" sz="2400" dirty="0"/>
-          </a:p>
-        </p:txBody>
-      </p:sp>
+              <a:lnSpc>
+                <a:spcPts val="2200"/>
+              </a:lnSpc>
+              <a:buNone/>
+            </a:pPr>
+            <a:r>
+              <a:rPr lang="en-US" sz="1600" dirty="0">
+                <a:solidFill>
+                  <a:srgbClr val="94A3B8"/>
+                </a:solidFill>
+              </a:rPr>
+              <a:t>N'importe qui dans votre entreprise peut moderniser un capteur sans prestataire.</a:t>
+            </a:r>
+            <a:endParaRPr lang="en-US" sz="1600" dirty="0"/>
+          </a:p>
+          <a:p>
+            <a:pPr indent="0" marL="0">
+              <a:lnSpc>
+                <a:spcPts val="2200"/>
+              </a:lnSpc>
+              <a:buNone/>
+            </a:pPr>
+            <a:endParaRPr lang="en-US" sz="1600" dirty="0"/>
+          </a:p>
+          <a:p>
+            <a:pPr indent="0" marL="0">
+              <a:lnSpc>
+                <a:spcPts val="2200"/>
+              </a:lnSpc>
+              <a:buNone/>
+            </a:pPr>
+            <a:r>
+              <a:rPr lang="en-US" sz="1600" dirty="0">
+                <a:solidFill>
+                  <a:srgbClr val="94A3B8"/>
+                </a:solidFill>
+              </a:rPr>
+              <a:t>Notre interface 'Drag &amp; Drop' s'occupe de la traduction de payload IoT en temps réel.</a:t>
+            </a:r>
+            <a:endParaRPr lang="en-US" sz="1600" dirty="0"/>
+          </a:p>
+        </p:txBody>
+      </p:sp>
+      <p:pic>
+        <p:nvPicPr>
+          <p:cNvPr id="5" name="Image 0" descr="C:/Users/taouf/Documents/antigravity lab/smart-building/frontend/public/marketing/sensor_appairage.png">    </p:cNvPr>
+          <p:cNvPicPr>
+            <a:picLocks noChangeAspect="1"/>
+          </p:cNvPicPr>
+          <p:nvPr/>
+        </p:nvPicPr>
+        <p:blipFill>
+          <a:blip r:embed="rId1"/>
+          <a:srcRect l="0" r="0" t="0" b="0"/>
+          <a:stretch/>
+        </p:blipFill>
+        <p:spPr>
+          <a:xfrm>
+            <a:off x="5029200" y="914400"/>
+            <a:ext cx="3657600" cy="3657600"/>
+          </a:xfrm>
+          <a:prstGeom prst="rect">
+            <a:avLst/>
+          </a:prstGeom>
+        </p:spPr>
+      </p:pic>
     </p:spTree>
   </p:cSld>
   <p:clrMapOvr>
@@ -2276,8 +2341,8 @@
         </p:nvSpPr>
         <p:spPr>
           <a:xfrm>
-            <a:off x="457200" y="914400"/>
-            <a:ext cx="8229600" cy="0"/>
+            <a:off x="457200" y="731520"/>
+            <a:ext cx="8229600" cy="731520"/>
           </a:xfrm>
           <a:prstGeom prst="rect">
             <a:avLst/>
@@ -2289,7 +2354,7 @@
           <a:bodyPr wrap="square" rtlCol="0" anchor="ctr"/>
           <a:lstStyle/>
           <a:p>
-            <a:pPr indent="0" marL="0">
+            <a:pPr algn="ctr" indent="0" marL="0">
               <a:buNone/>
             </a:pPr>
             <a:r>
@@ -2298,7 +2363,7 @@
                   <a:srgbClr val="FFFFFF"/>
                 </a:solidFill>
               </a:rPr>
-              <a:t>Du capteur au tableau de bord en 3 clics.</a:t>
+              <a:t>Garantir la conformité. Booster la marge.</a:t>
             </a:r>
             <a:endParaRPr lang="en-US" sz="3600" dirty="0"/>
           </a:p>
@@ -2306,14 +2371,34 @@
       </p:sp>
       <p:sp>
         <p:nvSpPr>
-          <p:cNvPr id="3" name="Text 1"/>
-          <p:cNvSpPr/>
-          <p:nvPr/>
-        </p:nvSpPr>
-        <p:spPr>
-          <a:xfrm>
-            <a:off x="457200" y="2743200"/>
-            <a:ext cx="7315200" cy="0"/>
+          <p:cNvPr id="3" name="Shape 1"/>
+          <p:cNvSpPr/>
+          <p:nvPr/>
+        </p:nvSpPr>
+        <p:spPr>
+          <a:xfrm>
+            <a:off x="914400" y="2011680"/>
+            <a:ext cx="2011680" cy="1828800"/>
+          </a:xfrm>
+          <a:prstGeom prst="roundRect">
+            <a:avLst/>
+          </a:prstGeom>
+          <a:solidFill>
+            <a:srgbClr val="1E293B"/>
+          </a:solidFill>
+          <a:ln/>
+        </p:spPr>
+      </p:sp>
+      <p:sp>
+        <p:nvSpPr>
+          <p:cNvPr id="4" name="Text 2"/>
+          <p:cNvSpPr/>
+          <p:nvPr/>
+        </p:nvSpPr>
+        <p:spPr>
+          <a:xfrm>
+            <a:off x="914400" y="2194560"/>
+            <a:ext cx="2011680" cy="548640"/>
           </a:xfrm>
           <a:prstGeom prst="rect">
             <a:avLst/>
@@ -2325,21 +2410,243 @@
           <a:bodyPr wrap="square" rtlCol="0" anchor="ctr"/>
           <a:lstStyle/>
           <a:p>
-            <a:pPr indent="0" marL="0">
-              <a:lnSpc>
-                <a:spcPts val="4000"/>
-              </a:lnSpc>
-              <a:buNone/>
-            </a:pPr>
-            <a:r>
-              <a:rPr lang="en-US" sz="2400" dirty="0">
-                <a:solidFill>
-                  <a:srgbClr val="CBD5E1"/>
-                </a:solidFill>
-              </a:rPr>
-              <a:t>Marre de payer des jours d'intégration ? Nos algorithmes permettent d'appairer visuellement un vieux capteur existant à un champ standard UBBEE par un simple 'Glisser-Déposer'.</a:t>
-            </a:r>
-            <a:endParaRPr lang="en-US" sz="2400" dirty="0"/>
+            <a:pPr algn="ctr" indent="0" marL="0">
+              <a:buNone/>
+            </a:pPr>
+            <a:r>
+              <a:rPr lang="en-US" sz="4000" b="1" dirty="0">
+                <a:solidFill>
+                  <a:srgbClr val="FFFFFF"/>
+                </a:solidFill>
+              </a:rPr>
+              <a:t>-40%</a:t>
+            </a:r>
+            <a:endParaRPr lang="en-US" sz="4000" dirty="0"/>
+          </a:p>
+        </p:txBody>
+      </p:sp>
+      <p:sp>
+        <p:nvSpPr>
+          <p:cNvPr id="5" name="Text 3"/>
+          <p:cNvSpPr/>
+          <p:nvPr/>
+        </p:nvSpPr>
+        <p:spPr>
+          <a:xfrm>
+            <a:off x="914400" y="2926080"/>
+            <a:ext cx="2011680" cy="365760"/>
+          </a:xfrm>
+          <a:prstGeom prst="rect">
+            <a:avLst/>
+          </a:prstGeom>
+          <a:noFill/>
+          <a:ln/>
+        </p:spPr>
+        <p:txBody>
+          <a:bodyPr wrap="square" rtlCol="0" anchor="ctr"/>
+          <a:lstStyle/>
+          <a:p>
+            <a:pPr algn="ctr" indent="0" marL="0">
+              <a:buNone/>
+            </a:pPr>
+            <a:r>
+              <a:rPr lang="en-US" sz="1600" b="1" dirty="0">
+                <a:solidFill>
+                  <a:srgbClr val="06B6D4"/>
+                </a:solidFill>
+              </a:rPr>
+              <a:t>Décret Tertiaire</a:t>
+            </a:r>
+            <a:endParaRPr lang="en-US" sz="1600" dirty="0"/>
+          </a:p>
+        </p:txBody>
+      </p:sp>
+      <p:sp>
+        <p:nvSpPr>
+          <p:cNvPr id="6" name="Shape 4"/>
+          <p:cNvSpPr/>
+          <p:nvPr/>
+        </p:nvSpPr>
+        <p:spPr>
+          <a:xfrm>
+            <a:off x="3474720" y="2011680"/>
+            <a:ext cx="2194560" cy="1828800"/>
+          </a:xfrm>
+          <a:prstGeom prst="roundRect">
+            <a:avLst/>
+          </a:prstGeom>
+          <a:solidFill>
+            <a:srgbClr val="101625"/>
+          </a:solidFill>
+          <a:ln w="25400">
+            <a:solidFill>
+              <a:srgbClr val="06B6D4"/>
+            </a:solidFill>
+            <a:prstDash val="solid"/>
+          </a:ln>
+        </p:spPr>
+      </p:sp>
+      <p:sp>
+        <p:nvSpPr>
+          <p:cNvPr id="7" name="Text 5"/>
+          <p:cNvSpPr/>
+          <p:nvPr/>
+        </p:nvSpPr>
+        <p:spPr>
+          <a:xfrm>
+            <a:off x="3474720" y="2194560"/>
+            <a:ext cx="2194560" cy="548640"/>
+          </a:xfrm>
+          <a:prstGeom prst="rect">
+            <a:avLst/>
+          </a:prstGeom>
+          <a:noFill/>
+          <a:ln/>
+        </p:spPr>
+        <p:txBody>
+          <a:bodyPr wrap="square" rtlCol="0" anchor="ctr"/>
+          <a:lstStyle/>
+          <a:p>
+            <a:pPr algn="ctr" indent="0" marL="0">
+              <a:buNone/>
+            </a:pPr>
+            <a:r>
+              <a:rPr lang="en-US" sz="4000" b="1" dirty="0">
+                <a:solidFill>
+                  <a:srgbClr val="06B6D4"/>
+                </a:solidFill>
+              </a:rPr>
+              <a:t>12 MWh</a:t>
+            </a:r>
+            <a:endParaRPr lang="en-US" sz="4000" dirty="0"/>
+          </a:p>
+        </p:txBody>
+      </p:sp>
+      <p:sp>
+        <p:nvSpPr>
+          <p:cNvPr id="8" name="Text 6"/>
+          <p:cNvSpPr/>
+          <p:nvPr/>
+        </p:nvSpPr>
+        <p:spPr>
+          <a:xfrm>
+            <a:off x="3474720" y="2926080"/>
+            <a:ext cx="2194560" cy="365760"/>
+          </a:xfrm>
+          <a:prstGeom prst="rect">
+            <a:avLst/>
+          </a:prstGeom>
+          <a:noFill/>
+          <a:ln/>
+        </p:spPr>
+        <p:txBody>
+          <a:bodyPr wrap="square" rtlCol="0" anchor="ctr"/>
+          <a:lstStyle/>
+          <a:p>
+            <a:pPr algn="ctr" indent="0" marL="0">
+              <a:buNone/>
+            </a:pPr>
+            <a:r>
+              <a:rPr lang="en-US" sz="1500" b="1" dirty="0">
+                <a:solidFill>
+                  <a:srgbClr val="FFFFFF"/>
+                </a:solidFill>
+              </a:rPr>
+              <a:t>Économisés par an</a:t>
+            </a:r>
+            <a:endParaRPr lang="en-US" sz="1500" dirty="0"/>
+          </a:p>
+        </p:txBody>
+      </p:sp>
+      <p:sp>
+        <p:nvSpPr>
+          <p:cNvPr id="9" name="Shape 7"/>
+          <p:cNvSpPr/>
+          <p:nvPr/>
+        </p:nvSpPr>
+        <p:spPr>
+          <a:xfrm>
+            <a:off x="6217920" y="2011680"/>
+            <a:ext cx="2011680" cy="1828800"/>
+          </a:xfrm>
+          <a:prstGeom prst="roundRect">
+            <a:avLst/>
+          </a:prstGeom>
+          <a:solidFill>
+            <a:srgbClr val="1E293B"/>
+          </a:solidFill>
+          <a:ln/>
+        </p:spPr>
+      </p:sp>
+      <p:sp>
+        <p:nvSpPr>
+          <p:cNvPr id="10" name="Text 8"/>
+          <p:cNvSpPr/>
+          <p:nvPr/>
+        </p:nvSpPr>
+        <p:spPr>
+          <a:xfrm>
+            <a:off x="6217920" y="2194560"/>
+            <a:ext cx="2011680" cy="548640"/>
+          </a:xfrm>
+          <a:prstGeom prst="rect">
+            <a:avLst/>
+          </a:prstGeom>
+          <a:noFill/>
+          <a:ln/>
+        </p:spPr>
+        <p:txBody>
+          <a:bodyPr wrap="square" rtlCol="0" anchor="ctr"/>
+          <a:lstStyle/>
+          <a:p>
+            <a:pPr algn="ctr" indent="0" marL="0">
+              <a:buNone/>
+            </a:pPr>
+            <a:r>
+              <a:rPr lang="en-US" sz="3600" b="1" dirty="0">
+                <a:solidFill>
+                  <a:srgbClr val="FFFFFF"/>
+                </a:solidFill>
+              </a:rPr>
+              <a:t>&lt; 14 mois</a:t>
+            </a:r>
+            <a:endParaRPr lang="en-US" sz="3600" dirty="0"/>
+          </a:p>
+        </p:txBody>
+      </p:sp>
+      <p:sp>
+        <p:nvSpPr>
+          <p:cNvPr id="11" name="Text 9"/>
+          <p:cNvSpPr/>
+          <p:nvPr/>
+        </p:nvSpPr>
+        <p:spPr>
+          <a:xfrm>
+            <a:off x="6217920" y="2926080"/>
+            <a:ext cx="2011680" cy="365760"/>
+          </a:xfrm>
+          <a:prstGeom prst="rect">
+            <a:avLst/>
+          </a:prstGeom>
+          <a:noFill/>
+          <a:ln/>
+        </p:spPr>
+        <p:txBody>
+          <a:bodyPr wrap="square" rtlCol="0" anchor="ctr"/>
+          <a:lstStyle/>
+          <a:p>
+            <a:pPr algn="ctr" indent="0" marL="0">
+              <a:buNone/>
+            </a:pPr>
+            <a:r>
+              <a:rPr lang="en-US" sz="1600" b="1" dirty="0">
+                <a:solidFill>
+                  <a:srgbClr val="06B6D4"/>
+                </a:solidFill>
+              </a:rPr>
+              <a:t>Rentabilité (ROI)</a:t>
+            </a:r>
+            <a:endParaRPr lang="en-US" sz="1600" dirty="0"/>
           </a:p>
         </p:txBody>
       </p:sp>
@@ -2376,8 +2683,8 @@
         </p:nvSpPr>
         <p:spPr>
           <a:xfrm>
-            <a:off x="457200" y="914400"/>
-            <a:ext cx="8229600" cy="0"/>
+            <a:off x="457200" y="1371600"/>
+            <a:ext cx="8229600" cy="731520"/>
           </a:xfrm>
           <a:prstGeom prst="rect">
             <a:avLst/>
@@ -2389,18 +2696,18 @@
           <a:bodyPr wrap="square" rtlCol="0" anchor="ctr"/>
           <a:lstStyle/>
           <a:p>
-            <a:pPr indent="0" marL="0">
-              <a:buNone/>
-            </a:pPr>
-            <a:r>
-              <a:rPr lang="en-US" sz="3600" b="1" dirty="0">
-                <a:solidFill>
-                  <a:srgbClr val="FFFFFF"/>
-                </a:solidFill>
-              </a:rPr>
-              <a:t>Un bâtiment qui anticipe grâce à l'IA.</a:t>
-            </a:r>
-            <a:endParaRPr lang="en-US" sz="3600" dirty="0"/>
+            <a:pPr algn="ctr" indent="0" marL="0">
+              <a:buNone/>
+            </a:pPr>
+            <a:r>
+              <a:rPr lang="en-US" sz="4000" b="1" dirty="0">
+                <a:solidFill>
+                  <a:srgbClr val="06B6D4"/>
+                </a:solidFill>
+              </a:rPr>
+              <a:t>Testez sur une salle. Convainquez-vous.</a:t>
+            </a:r>
+            <a:endParaRPr lang="en-US" sz="4000" dirty="0"/>
           </a:p>
         </p:txBody>
       </p:sp>
@@ -2412,8 +2719,8 @@
         </p:nvSpPr>
         <p:spPr>
           <a:xfrm>
-            <a:off x="457200" y="2286000"/>
-            <a:ext cx="7315200" cy="0"/>
+            <a:off x="457200" y="2560320"/>
+            <a:ext cx="8229600" cy="1371600"/>
           </a:xfrm>
           <a:prstGeom prst="rect">
             <a:avLst/>
@@ -2425,528 +2732,55 @@
           <a:bodyPr wrap="square" rtlCol="0" anchor="ctr"/>
           <a:lstStyle/>
           <a:p>
-            <a:pPr indent="0" marL="0">
-              <a:lnSpc>
-                <a:spcPts val="4000"/>
-              </a:lnSpc>
-              <a:buNone/>
-            </a:pPr>
-            <a:r>
-              <a:rPr lang="en-US" sz="2200" dirty="0">
-                <a:solidFill>
-                  <a:srgbClr val="F8FAFC"/>
-                </a:solidFill>
-              </a:rPr>
-              <a:t>Ne subissez plus l'exploitation. UBBEE analyse silencieusement vos données et vous suggère des réglages optimisés de consignes.</a:t>
-            </a:r>
-            <a:endParaRPr lang="en-US" sz="2200" dirty="0"/>
-          </a:p>
-          <a:p>
-            <a:pPr indent="0" marL="0">
-              <a:lnSpc>
-                <a:spcPts val="4000"/>
-              </a:lnSpc>
-              <a:buNone/>
-            </a:pPr>
-            <a:endParaRPr lang="en-US" sz="2200" dirty="0"/>
-          </a:p>
-          <a:p>
-            <a:pPr indent="0" marL="0">
-              <a:lnSpc>
-                <a:spcPts val="4000"/>
-              </a:lnSpc>
-              <a:buNone/>
-            </a:pPr>
-            <a:r>
-              <a:rPr lang="en-US" sz="2200" dirty="0">
-                <a:solidFill>
-                  <a:srgbClr val="F8FAFC"/>
-                </a:solidFill>
-              </a:rPr>
-              <a:t>L'IA propose, le responsable technique Valide. Vous gardez 100% du contrôle.</a:t>
-            </a:r>
-            <a:endParaRPr lang="en-US" sz="2200" dirty="0"/>
-          </a:p>
-        </p:txBody>
-      </p:sp>
-    </p:spTree>
-  </p:cSld>
-  <p:clrMapOvr>
-    <a:masterClrMapping/>
-  </p:clrMapOvr>
-</p:sld>
-</file>
-
-<file path=ppt/slides/slide7.xml><?xml version="1.0" encoding="utf-8"?>
-<p:sld xmlns:a="http://schemas.openxmlformats.org/drawingml/2006/main" xmlns:r="http://schemas.openxmlformats.org/officeDocument/2006/relationships" xmlns:p="http://schemas.openxmlformats.org/presentationml/2006/main">
-  <p:cSld name="Slide 7">
-    <p:spTree>
-      <p:nvGrpSpPr>
-        <p:cNvPr id="1" name=""/>
-        <p:cNvGrpSpPr/>
-        <p:nvPr/>
-      </p:nvGrpSpPr>
-      <p:grpSpPr>
-        <a:xfrm>
-          <a:off x="0" y="0"/>
-          <a:ext cx="0" cy="0"/>
-          <a:chOff x="0" y="0"/>
-          <a:chExt cx="0" cy="0"/>
-        </a:xfrm>
-      </p:grpSpPr>
-      <p:sp>
-        <p:nvSpPr>
-          <p:cNvPr id="2" name="Text 0"/>
-          <p:cNvSpPr/>
-          <p:nvPr/>
-        </p:nvSpPr>
-        <p:spPr>
-          <a:xfrm>
-            <a:off x="457200" y="914400"/>
-            <a:ext cx="8229600" cy="0"/>
-          </a:xfrm>
-          <a:prstGeom prst="rect">
-            <a:avLst/>
-          </a:prstGeom>
-          <a:noFill/>
-          <a:ln/>
-        </p:spPr>
-        <p:txBody>
-          <a:bodyPr wrap="square" rtlCol="0" anchor="ctr"/>
-          <a:lstStyle/>
-          <a:p>
-            <a:pPr indent="0" marL="0">
-              <a:buNone/>
-            </a:pPr>
-            <a:r>
-              <a:rPr lang="en-US" sz="3600" b="1" dirty="0">
-                <a:solidFill>
-                  <a:srgbClr val="FFFFFF"/>
-                </a:solidFill>
-              </a:rPr>
-              <a:t>Cas d'usage en situation réelle.</a:t>
-            </a:r>
-            <a:endParaRPr lang="en-US" sz="3600" dirty="0"/>
-          </a:p>
-        </p:txBody>
-      </p:sp>
-      <p:sp>
-        <p:nvSpPr>
-          <p:cNvPr id="3" name="Text 1"/>
-          <p:cNvSpPr/>
-          <p:nvPr/>
-        </p:nvSpPr>
-        <p:spPr>
-          <a:xfrm>
-            <a:off x="457200" y="2286000"/>
-            <a:ext cx="7315200" cy="0"/>
-          </a:xfrm>
-          <a:prstGeom prst="rect">
-            <a:avLst/>
-          </a:prstGeom>
-          <a:noFill/>
-          <a:ln/>
-        </p:spPr>
-        <p:txBody>
-          <a:bodyPr wrap="square" rtlCol="0" anchor="ctr"/>
-          <a:lstStyle/>
-          <a:p>
-            <a:pPr indent="0" marL="0">
-              <a:lnSpc>
-                <a:spcPts val="4000"/>
-              </a:lnSpc>
-              <a:buNone/>
-            </a:pPr>
-            <a:r>
-              <a:rPr lang="en-US" sz="2000" dirty="0">
-                <a:solidFill>
-                  <a:srgbClr val="F8FAFC"/>
-                </a:solidFill>
-              </a:rPr>
-              <a:t>Mise en place sur une Résidence d'Entreprise de 5 000 m² :</a:t>
-            </a:r>
-            <a:endParaRPr lang="en-US" sz="2000" dirty="0"/>
-          </a:p>
-          <a:p>
-            <a:pPr indent="0" marL="0">
-              <a:lnSpc>
-                <a:spcPts val="4000"/>
-              </a:lnSpc>
-              <a:buNone/>
-            </a:pPr>
-            <a:r>
-              <a:rPr lang="en-US" sz="2000" dirty="0">
-                <a:solidFill>
-                  <a:srgbClr val="F8FAFC"/>
-                </a:solidFill>
-              </a:rPr>
-              <a:t>• Déploiement de 40 capteurs IoT multi-zones sans câblage lourd (1 week-end).</a:t>
-            </a:r>
-            <a:endParaRPr lang="en-US" sz="2000" dirty="0"/>
-          </a:p>
-          <a:p>
-            <a:pPr indent="0" marL="0">
-              <a:lnSpc>
-                <a:spcPts val="4000"/>
-              </a:lnSpc>
-              <a:buNone/>
-            </a:pPr>
-            <a:r>
-              <a:rPr lang="en-US" sz="2000" dirty="0">
-                <a:solidFill>
-                  <a:srgbClr val="F8FAFC"/>
-                </a:solidFill>
-              </a:rPr>
-              <a:t>• -18% de consommation de base le 1er mois grâce à la détection des fuites.</a:t>
-            </a:r>
-            <a:endParaRPr lang="en-US" sz="2000" dirty="0"/>
-          </a:p>
-          <a:p>
-            <a:pPr indent="0" marL="0">
-              <a:lnSpc>
-                <a:spcPts val="4000"/>
-              </a:lnSpc>
-              <a:buNone/>
-            </a:pPr>
-            <a:r>
-              <a:rPr lang="en-US" sz="2000" dirty="0">
-                <a:solidFill>
-                  <a:srgbClr val="F8FAFC"/>
-                </a:solidFill>
-              </a:rPr>
-              <a:t>• -60% de tickets de plainte collaborateurs 'trop chaud/trop froid'.</a:t>
-            </a:r>
-            <a:endParaRPr lang="en-US" sz="2000" dirty="0"/>
-          </a:p>
-        </p:txBody>
-      </p:sp>
-    </p:spTree>
-  </p:cSld>
-  <p:clrMapOvr>
-    <a:masterClrMapping/>
-  </p:clrMapOvr>
-</p:sld>
-</file>
-
-<file path=ppt/slides/slide8.xml><?xml version="1.0" encoding="utf-8"?>
-<p:sld xmlns:a="http://schemas.openxmlformats.org/drawingml/2006/main" xmlns:r="http://schemas.openxmlformats.org/officeDocument/2006/relationships" xmlns:p="http://schemas.openxmlformats.org/presentationml/2006/main">
-  <p:cSld name="Slide 8">
-    <p:spTree>
-      <p:nvGrpSpPr>
-        <p:cNvPr id="1" name=""/>
-        <p:cNvGrpSpPr/>
-        <p:nvPr/>
-      </p:nvGrpSpPr>
-      <p:grpSpPr>
-        <a:xfrm>
-          <a:off x="0" y="0"/>
-          <a:ext cx="0" cy="0"/>
-          <a:chOff x="0" y="0"/>
-          <a:chExt cx="0" cy="0"/>
-        </a:xfrm>
-      </p:grpSpPr>
-      <p:sp>
-        <p:nvSpPr>
-          <p:cNvPr id="2" name="Text 0"/>
-          <p:cNvSpPr/>
-          <p:nvPr/>
-        </p:nvSpPr>
-        <p:spPr>
-          <a:xfrm>
-            <a:off x="457200" y="914400"/>
-            <a:ext cx="8229600" cy="0"/>
-          </a:xfrm>
-          <a:prstGeom prst="rect">
-            <a:avLst/>
-          </a:prstGeom>
-          <a:noFill/>
-          <a:ln/>
-        </p:spPr>
-        <p:txBody>
-          <a:bodyPr wrap="square" rtlCol="0" anchor="ctr"/>
-          <a:lstStyle/>
-          <a:p>
-            <a:pPr indent="0" marL="0">
-              <a:buNone/>
-            </a:pPr>
-            <a:r>
-              <a:rPr lang="en-US" sz="3600" b="1" dirty="0">
-                <a:solidFill>
-                  <a:srgbClr val="FFFFFF"/>
-                </a:solidFill>
-              </a:rPr>
-              <a:t>Un modèle aligné sur votre succès.</a:t>
-            </a:r>
-            <a:endParaRPr lang="en-US" sz="3600" dirty="0"/>
-          </a:p>
-        </p:txBody>
-      </p:sp>
-      <p:sp>
-        <p:nvSpPr>
-          <p:cNvPr id="3" name="Text 1"/>
-          <p:cNvSpPr/>
-          <p:nvPr/>
-        </p:nvSpPr>
-        <p:spPr>
-          <a:xfrm>
-            <a:off x="457200" y="2286000"/>
-            <a:ext cx="7315200" cy="0"/>
-          </a:xfrm>
-          <a:prstGeom prst="rect">
-            <a:avLst/>
-          </a:prstGeom>
-          <a:noFill/>
-          <a:ln/>
-        </p:spPr>
-        <p:txBody>
-          <a:bodyPr wrap="square" rtlCol="0" anchor="ctr"/>
-          <a:lstStyle/>
-          <a:p>
-            <a:pPr indent="0" marL="0">
+            <a:pPr algn="ctr" indent="0" marL="0">
               <a:lnSpc>
                 <a:spcPts val="3500"/>
               </a:lnSpc>
               <a:buNone/>
             </a:pPr>
             <a:r>
-              <a:rPr lang="en-US" sz="2200" dirty="0">
-                <a:solidFill>
-                  <a:srgbClr val="F8FAFC"/>
-                </a:solidFill>
-              </a:rPr>
-              <a:t>Vous ne payez que le flux, pas des licences serveur complexes.</a:t>
-            </a:r>
-            <a:endParaRPr lang="en-US" sz="2200" dirty="0"/>
-          </a:p>
-          <a:p>
-            <a:pPr indent="0" marL="0">
+              <a:rPr lang="en-US" sz="2400" dirty="0">
+                <a:solidFill>
+                  <a:srgbClr val="FFFFFF"/>
+                </a:solidFill>
+              </a:rPr>
+              <a:t>1. Réservez un Audit Digital (45 min)</a:t>
+            </a:r>
+            <a:endParaRPr lang="en-US" sz="2400" dirty="0"/>
+          </a:p>
+          <a:p>
+            <a:pPr algn="ctr" indent="0" marL="0">
               <a:lnSpc>
                 <a:spcPts val="3500"/>
               </a:lnSpc>
               <a:buNone/>
             </a:pPr>
-            <a:endParaRPr lang="en-US" sz="2200" dirty="0"/>
-          </a:p>
-          <a:p>
-            <a:pPr indent="0" marL="0">
+            <a:r>
+              <a:rPr lang="en-US" sz="2400" dirty="0">
+                <a:solidFill>
+                  <a:srgbClr val="FFFFFF"/>
+                </a:solidFill>
+              </a:rPr>
+              <a:t>2. Choix d'un Bâtiment Pilote</a:t>
+            </a:r>
+            <a:endParaRPr lang="en-US" sz="2400" dirty="0"/>
+          </a:p>
+          <a:p>
+            <a:pPr algn="ctr" indent="0" marL="0">
               <a:lnSpc>
                 <a:spcPts val="3500"/>
               </a:lnSpc>
               <a:buNone/>
             </a:pPr>
             <a:r>
-              <a:rPr lang="en-US" sz="2200" dirty="0">
-                <a:solidFill>
-                  <a:srgbClr val="F8FAFC"/>
-                </a:solidFill>
-              </a:rPr>
-              <a:t>• Matériel IoT (One-Shot) : Coût d'achat très faible et abordable.</a:t>
-            </a:r>
-            <a:endParaRPr lang="en-US" sz="2200" dirty="0"/>
-          </a:p>
-          <a:p>
-            <a:pPr indent="0" marL="0">
-              <a:lnSpc>
-                <a:spcPts val="3500"/>
-              </a:lnSpc>
-              <a:buNone/>
-            </a:pPr>
-            <a:r>
-              <a:rPr lang="en-US" sz="2200" dirty="0">
-                <a:solidFill>
-                  <a:srgbClr val="F8FAFC"/>
-                </a:solidFill>
-              </a:rPr>
-              <a:t>• Licence Plateforme SaaS : Facturation au mètre carré supervisé ou capteur raccordé.</a:t>
-            </a:r>
-            <a:endParaRPr lang="en-US" sz="2200" dirty="0"/>
-          </a:p>
-          <a:p>
-            <a:pPr indent="0" marL="0">
-              <a:lnSpc>
-                <a:spcPts val="3500"/>
-              </a:lnSpc>
-              <a:buNone/>
-            </a:pPr>
-            <a:r>
-              <a:rPr lang="en-US" sz="2200" dirty="0">
-                <a:solidFill>
-                  <a:srgbClr val="F8FAFC"/>
-                </a:solidFill>
-              </a:rPr>
-              <a:t>• Mises à jour incluses.</a:t>
-            </a:r>
-            <a:endParaRPr lang="en-US" sz="2200" dirty="0"/>
-          </a:p>
-        </p:txBody>
-      </p:sp>
-    </p:spTree>
-  </p:cSld>
-  <p:clrMapOvr>
-    <a:masterClrMapping/>
-  </p:clrMapOvr>
-</p:sld>
-</file>
-
-<file path=ppt/slides/slide9.xml><?xml version="1.0" encoding="utf-8"?>
-<p:sld xmlns:a="http://schemas.openxmlformats.org/drawingml/2006/main" xmlns:r="http://schemas.openxmlformats.org/officeDocument/2006/relationships" xmlns:p="http://schemas.openxmlformats.org/presentationml/2006/main">
-  <p:cSld name="Slide 9">
-    <p:spTree>
-      <p:nvGrpSpPr>
-        <p:cNvPr id="1" name=""/>
-        <p:cNvGrpSpPr/>
-        <p:nvPr/>
-      </p:nvGrpSpPr>
-      <p:grpSpPr>
-        <a:xfrm>
-          <a:off x="0" y="0"/>
-          <a:ext cx="0" cy="0"/>
-          <a:chOff x="0" y="0"/>
-          <a:chExt cx="0" cy="0"/>
-        </a:xfrm>
-      </p:grpSpPr>
-      <p:sp>
-        <p:nvSpPr>
-          <p:cNvPr id="2" name="Text 0"/>
-          <p:cNvSpPr/>
-          <p:nvPr/>
-        </p:nvSpPr>
-        <p:spPr>
-          <a:xfrm>
-            <a:off x="457200" y="914400"/>
-            <a:ext cx="8229600" cy="0"/>
-          </a:xfrm>
-          <a:prstGeom prst="rect">
-            <a:avLst/>
-          </a:prstGeom>
-          <a:noFill/>
-          <a:ln/>
-        </p:spPr>
-        <p:txBody>
-          <a:bodyPr wrap="square" rtlCol="0" anchor="ctr"/>
-          <a:lstStyle/>
-          <a:p>
-            <a:pPr indent="0" marL="0">
-              <a:buNone/>
-            </a:pPr>
-            <a:r>
-              <a:rPr lang="en-US" sz="3600" b="1" dirty="0">
-                <a:solidFill>
-                  <a:srgbClr val="06B6D4"/>
-                </a:solidFill>
-              </a:rPr>
-              <a:t>Prêt à allumer la lumière sur vos données ?</a:t>
-            </a:r>
-            <a:endParaRPr lang="en-US" sz="3600" dirty="0"/>
-          </a:p>
-        </p:txBody>
-      </p:sp>
-      <p:sp>
-        <p:nvSpPr>
-          <p:cNvPr id="3" name="Text 1"/>
-          <p:cNvSpPr/>
-          <p:nvPr/>
-        </p:nvSpPr>
-        <p:spPr>
-          <a:xfrm>
-            <a:off x="457200" y="2286000"/>
-            <a:ext cx="6858000" cy="0"/>
-          </a:xfrm>
-          <a:prstGeom prst="rect">
-            <a:avLst/>
-          </a:prstGeom>
-          <a:noFill/>
-          <a:ln/>
-        </p:spPr>
-        <p:txBody>
-          <a:bodyPr wrap="square" rtlCol="0" anchor="ctr"/>
-          <a:lstStyle/>
-          <a:p>
-            <a:pPr indent="0" marL="0">
-              <a:buNone/>
-            </a:pPr>
-            <a:r>
-              <a:rPr lang="en-US" sz="2400" b="1" dirty="0">
+              <a:rPr lang="en-US" sz="2400" dirty="0">
                 <a:solidFill>
                   <a:srgbClr val="FFFFFF"/>
                 </a:solidFill>
               </a:rPr>
-              <a:t>Prochaines étapes :</a:t>
+              <a:t>3. Lancement du POC gratuit</a:t>
             </a:r>
             <a:endParaRPr lang="en-US" sz="2400" dirty="0"/>
-          </a:p>
-        </p:txBody>
-      </p:sp>
-      <p:sp>
-        <p:nvSpPr>
-          <p:cNvPr id="4" name="Text 2"/>
-          <p:cNvSpPr/>
-          <p:nvPr/>
-        </p:nvSpPr>
-        <p:spPr>
-          <a:xfrm>
-            <a:off x="457200" y="3200400"/>
-            <a:ext cx="7315200" cy="0"/>
-          </a:xfrm>
-          <a:prstGeom prst="rect">
-            <a:avLst/>
-          </a:prstGeom>
-          <a:noFill/>
-          <a:ln/>
-        </p:spPr>
-        <p:txBody>
-          <a:bodyPr wrap="square" rtlCol="0" anchor="ctr"/>
-          <a:lstStyle/>
-          <a:p>
-            <a:pPr indent="0" marL="0">
-              <a:lnSpc>
-                <a:spcPts val="4000"/>
-              </a:lnSpc>
-              <a:buNone/>
-            </a:pPr>
-            <a:r>
-              <a:rPr lang="en-US" sz="2200" dirty="0">
-                <a:solidFill>
-                  <a:srgbClr val="F8FAFC"/>
-                </a:solidFill>
-              </a:rPr>
-              <a:t>1. Réservez une Démonstration Live Personnalisée (45 min).</a:t>
-            </a:r>
-            <a:endParaRPr lang="en-US" sz="2200" dirty="0"/>
-          </a:p>
-          <a:p>
-            <a:pPr indent="0" marL="0">
-              <a:lnSpc>
-                <a:spcPts val="4000"/>
-              </a:lnSpc>
-              <a:buNone/>
-            </a:pPr>
-            <a:r>
-              <a:rPr lang="en-US" sz="2200" dirty="0">
-                <a:solidFill>
-                  <a:srgbClr val="F8FAFC"/>
-                </a:solidFill>
-              </a:rPr>
-              <a:t>2. Sélectionnons ensemble l'une de vos salles de réunion 'pilotes'.</a:t>
-            </a:r>
-            <a:endParaRPr lang="en-US" sz="2200" dirty="0"/>
-          </a:p>
-          <a:p>
-            <a:pPr indent="0" marL="0">
-              <a:lnSpc>
-                <a:spcPts val="4000"/>
-              </a:lnSpc>
-              <a:buNone/>
-            </a:pPr>
-            <a:r>
-              <a:rPr lang="en-US" sz="2200" dirty="0">
-                <a:solidFill>
-                  <a:srgbClr val="F8FAFC"/>
-                </a:solidFill>
-              </a:rPr>
-              <a:t>3. Lançons un Proof of Concept (POC) gratuit sur 15 jours.</a:t>
-            </a:r>
-            <a:endParaRPr lang="en-US" sz="2200" dirty="0"/>
           </a:p>
         </p:txBody>
       </p:sp>

</xml_diff>